<commit_message>
updated: report presentation minor changes on code
</commit_message>
<xml_diff>
--- a/relatorio/motion_graphs_presentation.pptx
+++ b/relatorio/motion_graphs_presentation.pptx
@@ -7228,13 +7228,8 @@
             <a:pPr lvl="1"/>
             <a:r>
               <a:rPr lang="en-GB" dirty="0" smtClean="0"/>
-              <a:t>Associate an error to each </a:t>
-            </a:r>
-            <a:r>
-              <a:rPr lang="en-GB" dirty="0" smtClean="0"/>
-              <a:t>animation:</a:t>
-            </a:r>
-            <a:endParaRPr lang="en-GB" dirty="0" smtClean="0"/>
+              <a:t>Associate an error to each animation:</a:t>
+            </a:r>
           </a:p>
         </p:txBody>
       </p:sp>
@@ -7361,7 +7356,7 @@
         </p:xfrm>
         <a:graphic>
           <a:graphicData uri="http://schemas.openxmlformats.org/presentationml/2006/ole">
-            <p:oleObj spid="_x0000_s36865" r:id="rId4" imgW="2618460" imgH="1404862" progId="Visio.Drawing.11">
+            <p:oleObj spid="_x0000_s36865" r:id="rId4" imgW="2618460" imgH="1404862" progId="">
               <p:embed/>
             </p:oleObj>
           </a:graphicData>
@@ -7439,26 +7434,13 @@
           <a:p>
             <a:r>
               <a:rPr lang="en-GB" dirty="0" smtClean="0"/>
-              <a:t>The </a:t>
-            </a:r>
+              <a:t>The process is repeated for all animations in each segment of the user defined path</a:t>
+            </a:r>
+          </a:p>
+          <a:p>
             <a:r>
               <a:rPr lang="en-GB" dirty="0" smtClean="0"/>
-              <a:t>process is repeated for all animations in each segment of the user defined path</a:t>
-            </a:r>
-            <a:endParaRPr lang="en-GB" dirty="0" smtClean="0"/>
-          </a:p>
-          <a:p>
-            <a:r>
-              <a:rPr lang="en-GB" dirty="0" smtClean="0"/>
-              <a:t>Then, for </a:t>
-            </a:r>
-            <a:r>
-              <a:rPr lang="en-GB" dirty="0" smtClean="0"/>
-              <a:t>each segment of the user defined path, we have the corresponding animation with the lowest </a:t>
-            </a:r>
-            <a:r>
-              <a:rPr lang="en-GB" dirty="0" smtClean="0"/>
-              <a:t>error</a:t>
+              <a:t>Then, for each segment of the user defined path, we have the corresponding animation with the lowest error</a:t>
             </a:r>
           </a:p>
           <a:p>
@@ -7621,11 +7603,7 @@
             </a:r>
             <a:r>
               <a:rPr lang="pt-PT" dirty="0" smtClean="0"/>
-              <a:t> </a:t>
-            </a:r>
-            <a:r>
-              <a:rPr lang="pt-PT" dirty="0" smtClean="0"/>
-              <a:t>demo</a:t>
+              <a:t> demo</a:t>
             </a:r>
           </a:p>
           <a:p>
@@ -7773,233 +7751,86 @@
         </p:nvSpPr>
         <p:spPr/>
         <p:txBody>
-          <a:bodyPr/>
-          <a:lstStyle/>
-          <a:p>
-            <a:r>
-              <a:rPr lang="pt-PT" dirty="0" smtClean="0"/>
-              <a:t>…</a:t>
-            </a:r>
-            <a:endParaRPr lang="pt-PT" dirty="0" smtClean="0"/>
-          </a:p>
-          <a:p>
-            <a:r>
-              <a:rPr lang="pt-PT" dirty="0" err="1" smtClean="0"/>
-              <a:t>The</a:t>
-            </a:r>
-            <a:r>
-              <a:rPr lang="pt-PT" dirty="0" smtClean="0"/>
-              <a:t> </a:t>
-            </a:r>
-            <a:r>
-              <a:rPr lang="pt-PT" dirty="0" err="1" smtClean="0"/>
-              <a:t>implementation</a:t>
-            </a:r>
-            <a:r>
-              <a:rPr lang="pt-PT" dirty="0" smtClean="0"/>
-              <a:t> </a:t>
-            </a:r>
-            <a:r>
-              <a:rPr lang="pt-PT" dirty="0" err="1" smtClean="0"/>
-              <a:t>still</a:t>
-            </a:r>
-            <a:r>
-              <a:rPr lang="pt-PT" dirty="0" smtClean="0"/>
-              <a:t> </a:t>
-            </a:r>
-            <a:r>
-              <a:rPr lang="pt-PT" dirty="0" err="1" smtClean="0"/>
-              <a:t>has</a:t>
-            </a:r>
-            <a:r>
-              <a:rPr lang="pt-PT" dirty="0" smtClean="0"/>
-              <a:t> a </a:t>
-            </a:r>
-            <a:r>
-              <a:rPr lang="pt-PT" dirty="0" err="1" smtClean="0"/>
-              <a:t>lot</a:t>
-            </a:r>
-            <a:r>
-              <a:rPr lang="pt-PT" dirty="0" smtClean="0"/>
-              <a:t> to </a:t>
-            </a:r>
-            <a:r>
-              <a:rPr lang="pt-PT" dirty="0" err="1" smtClean="0"/>
-              <a:t>improve</a:t>
-            </a:r>
-            <a:endParaRPr lang="pt-PT" dirty="0" smtClean="0"/>
+          <a:bodyPr>
+            <a:normAutofit lnSpcReduction="10000"/>
+          </a:bodyPr>
+          <a:lstStyle/>
+          <a:p>
+            <a:r>
+              <a:rPr lang="en-US" dirty="0" smtClean="0"/>
+              <a:t>Encountered some non expected problems:</a:t>
+            </a:r>
           </a:p>
           <a:p>
             <a:pPr lvl="1"/>
             <a:r>
-              <a:rPr lang="pt-PT" dirty="0" smtClean="0"/>
+              <a:rPr lang="en-US" dirty="0" smtClean="0"/>
+              <a:t>The animation must be rendered to register the movements</a:t>
+            </a:r>
+          </a:p>
+          <a:p>
+            <a:pPr lvl="1"/>
+            <a:r>
+              <a:rPr lang="en-US" dirty="0" err="1" smtClean="0"/>
+              <a:t>MoCap</a:t>
+            </a:r>
+            <a:r>
+              <a:rPr lang="en-US" dirty="0" smtClean="0"/>
+              <a:t> animations do not start at </a:t>
+            </a:r>
+            <a:r>
+              <a:rPr lang="en-US" smtClean="0"/>
+              <a:t>position (0,0,0)</a:t>
+            </a:r>
+          </a:p>
+          <a:p>
+            <a:pPr>
+              <a:buNone/>
+            </a:pPr>
+            <a:endParaRPr lang="en-US" dirty="0" smtClean="0"/>
+          </a:p>
+          <a:p>
+            <a:r>
+              <a:rPr lang="en-US" dirty="0" smtClean="0"/>
+              <a:t>The implementation still has a lot to improve</a:t>
+            </a:r>
+          </a:p>
+          <a:p>
+            <a:pPr lvl="1"/>
+            <a:r>
+              <a:rPr lang="en-US" dirty="0" smtClean="0"/>
               <a:t>Use </a:t>
             </a:r>
             <a:r>
-              <a:rPr lang="pt-PT" dirty="0" err="1" smtClean="0"/>
+              <a:rPr lang="en-US" dirty="0" err="1" smtClean="0"/>
               <a:t>splines</a:t>
             </a:r>
             <a:r>
-              <a:rPr lang="pt-PT" dirty="0" smtClean="0"/>
-              <a:t> for </a:t>
-            </a:r>
-            <a:r>
-              <a:rPr lang="pt-PT" dirty="0" err="1" smtClean="0"/>
-              <a:t>the</a:t>
-            </a:r>
-            <a:r>
-              <a:rPr lang="pt-PT" dirty="0" smtClean="0"/>
-              <a:t> </a:t>
-            </a:r>
-            <a:r>
-              <a:rPr lang="pt-PT" dirty="0" err="1" smtClean="0"/>
-              <a:t>user</a:t>
-            </a:r>
-            <a:r>
-              <a:rPr lang="pt-PT" dirty="0" smtClean="0"/>
-              <a:t> </a:t>
-            </a:r>
-            <a:r>
-              <a:rPr lang="pt-PT" dirty="0" err="1" smtClean="0"/>
-              <a:t>defined</a:t>
-            </a:r>
-            <a:r>
-              <a:rPr lang="pt-PT" dirty="0" smtClean="0"/>
-              <a:t> </a:t>
-            </a:r>
-            <a:r>
-              <a:rPr lang="pt-PT" dirty="0" err="1" smtClean="0"/>
-              <a:t>path</a:t>
-            </a:r>
-            <a:endParaRPr lang="pt-PT" dirty="0" smtClean="0"/>
+              <a:rPr lang="en-US" dirty="0" smtClean="0"/>
+              <a:t> for the user defined path</a:t>
+            </a:r>
           </a:p>
           <a:p>
             <a:pPr lvl="1"/>
             <a:r>
-              <a:rPr lang="pt-PT" dirty="0" err="1" smtClean="0"/>
-              <a:t>Correct</a:t>
-            </a:r>
-            <a:r>
-              <a:rPr lang="pt-PT" dirty="0" smtClean="0"/>
-              <a:t> </a:t>
-            </a:r>
-            <a:r>
-              <a:rPr lang="pt-PT" dirty="0" err="1" smtClean="0"/>
-              <a:t>the</a:t>
-            </a:r>
-            <a:r>
-              <a:rPr lang="pt-PT" dirty="0" smtClean="0"/>
-              <a:t> </a:t>
-            </a:r>
-            <a:r>
-              <a:rPr lang="pt-PT" dirty="0" err="1" smtClean="0"/>
-              <a:t>display</a:t>
-            </a:r>
-            <a:r>
-              <a:rPr lang="pt-PT" dirty="0" smtClean="0"/>
-              <a:t> </a:t>
-            </a:r>
-            <a:r>
-              <a:rPr lang="pt-PT" dirty="0" err="1" smtClean="0"/>
-              <a:t>of</a:t>
-            </a:r>
-            <a:r>
-              <a:rPr lang="pt-PT" dirty="0" smtClean="0"/>
-              <a:t> </a:t>
-            </a:r>
-            <a:r>
-              <a:rPr lang="pt-PT" dirty="0" err="1" smtClean="0"/>
-              <a:t>the</a:t>
-            </a:r>
-            <a:r>
-              <a:rPr lang="pt-PT" dirty="0" smtClean="0"/>
-              <a:t> </a:t>
-            </a:r>
-            <a:r>
-              <a:rPr lang="pt-PT" dirty="0" err="1" smtClean="0"/>
-              <a:t>calculated</a:t>
-            </a:r>
-            <a:r>
-              <a:rPr lang="pt-PT" dirty="0" smtClean="0"/>
-              <a:t> </a:t>
-            </a:r>
-            <a:r>
-              <a:rPr lang="pt-PT" dirty="0" err="1" smtClean="0"/>
-              <a:t>motion</a:t>
-            </a:r>
-            <a:endParaRPr lang="pt-PT" dirty="0" smtClean="0"/>
+              <a:rPr lang="en-US" dirty="0" smtClean="0"/>
+              <a:t>Correct the display of the calculated motion</a:t>
+            </a:r>
           </a:p>
           <a:p>
             <a:pPr lvl="1"/>
             <a:r>
-              <a:rPr lang="pt-PT" dirty="0" err="1" smtClean="0"/>
-              <a:t>Fully</a:t>
-            </a:r>
-            <a:r>
-              <a:rPr lang="pt-PT" dirty="0" smtClean="0"/>
-              <a:t> </a:t>
-            </a:r>
-            <a:r>
-              <a:rPr lang="pt-PT" dirty="0" err="1" smtClean="0"/>
-              <a:t>integrate</a:t>
-            </a:r>
-            <a:r>
-              <a:rPr lang="pt-PT" dirty="0" smtClean="0"/>
-              <a:t> </a:t>
-            </a:r>
-            <a:r>
-              <a:rPr lang="pt-PT" dirty="0" err="1" smtClean="0"/>
-              <a:t>with</a:t>
-            </a:r>
-            <a:r>
-              <a:rPr lang="pt-PT" dirty="0" smtClean="0"/>
-              <a:t> </a:t>
-            </a:r>
-            <a:r>
-              <a:rPr lang="pt-PT" dirty="0" err="1" smtClean="0"/>
-              <a:t>the</a:t>
-            </a:r>
-            <a:r>
-              <a:rPr lang="pt-PT" dirty="0" smtClean="0"/>
-              <a:t> </a:t>
-            </a:r>
-            <a:r>
-              <a:rPr lang="pt-PT" dirty="0" err="1" smtClean="0"/>
-              <a:t>remaining</a:t>
-            </a:r>
-            <a:r>
-              <a:rPr lang="pt-PT" dirty="0" smtClean="0"/>
-              <a:t> </a:t>
-            </a:r>
-            <a:r>
-              <a:rPr lang="pt-PT" dirty="0" err="1" smtClean="0"/>
-              <a:t>system</a:t>
-            </a:r>
-            <a:endParaRPr lang="pt-PT" dirty="0" smtClean="0"/>
+              <a:rPr lang="en-US" dirty="0" smtClean="0"/>
+              <a:t>Fully integrate with the remaining system</a:t>
+            </a:r>
           </a:p>
           <a:p>
             <a:pPr lvl="1"/>
             <a:r>
-              <a:rPr lang="pt-PT" dirty="0" err="1" smtClean="0"/>
-              <a:t>Improve</a:t>
-            </a:r>
-            <a:r>
-              <a:rPr lang="pt-PT" dirty="0" smtClean="0"/>
-              <a:t> </a:t>
-            </a:r>
-            <a:r>
-              <a:rPr lang="pt-PT" dirty="0" err="1" smtClean="0"/>
-              <a:t>user</a:t>
-            </a:r>
-            <a:r>
-              <a:rPr lang="pt-PT" dirty="0" smtClean="0"/>
-              <a:t> </a:t>
-            </a:r>
-            <a:r>
-              <a:rPr lang="pt-PT" dirty="0" err="1" smtClean="0"/>
-              <a:t>interaction</a:t>
-            </a:r>
-            <a:endParaRPr lang="pt-PT" dirty="0"/>
+              <a:rPr lang="en-US" dirty="0" smtClean="0"/>
+              <a:t>Improve user interaction</a:t>
+            </a:r>
+            <a:endParaRPr lang="en-US" dirty="0"/>
           </a:p>
         </p:txBody>
       </p:sp>
@@ -8358,7 +8189,6 @@
               <a:rPr lang="en-US" dirty="0" smtClean="0"/>
               <a:t>Conclusions and future work</a:t>
             </a:r>
-            <a:endParaRPr lang="en-US" dirty="0" smtClean="0"/>
           </a:p>
           <a:p>
             <a:endParaRPr lang="en-US" dirty="0"/>
@@ -8553,7 +8383,7 @@
             </a:r>
             <a:r>
               <a:rPr lang="pt-PT" dirty="0" err="1" smtClean="0"/>
-              <a:t>Al</a:t>
+              <a:t>al</a:t>
             </a:r>
             <a:endParaRPr lang="en-US" dirty="0" smtClean="0"/>
           </a:p>

</xml_diff>